<commit_message>
removed unused (hidden) slides
</commit_message>
<xml_diff>
--- a/slides.pptx
+++ b/slides.pptx
@@ -5,10 +5,10 @@
     <p:sldMasterId id="2147483660" r:id="rId1"/>
   </p:sldMasterIdLst>
   <p:notesMasterIdLst>
-    <p:notesMasterId r:id="rId44"/>
+    <p:notesMasterId r:id="rId40"/>
   </p:notesMasterIdLst>
   <p:handoutMasterIdLst>
-    <p:handoutMasterId r:id="rId45"/>
+    <p:handoutMasterId r:id="rId41"/>
   </p:handoutMasterIdLst>
   <p:sldIdLst>
     <p:sldId id="256" r:id="rId2"/>
@@ -49,10 +49,6 @@
     <p:sldId id="288" r:id="rId37"/>
     <p:sldId id="291" r:id="rId38"/>
     <p:sldId id="292" r:id="rId39"/>
-    <p:sldId id="293" r:id="rId40"/>
-    <p:sldId id="279" r:id="rId41"/>
-    <p:sldId id="267" r:id="rId42"/>
-    <p:sldId id="294" r:id="rId43"/>
   </p:sldIdLst>
   <p:sldSz cx="10799763" cy="7199313"/>
   <p:notesSz cx="7104063" cy="10234613"/>
@@ -2635,128 +2631,6 @@
 </p:notes>
 </file>
 
-<file path=ppt/notesSlides/notesSlide38.xml><?xml version="1.0" encoding="utf-8"?>
-<p:notes xmlns:a="http://schemas.openxmlformats.org/drawingml/2006/main" xmlns:r="http://schemas.openxmlformats.org/officeDocument/2006/relationships" xmlns:p="http://schemas.openxmlformats.org/presentationml/2006/main">
-  <p:cSld>
-    <p:spTree>
-      <p:nvGrpSpPr>
-        <p:cNvPr id="1" name=""/>
-        <p:cNvGrpSpPr/>
-        <p:nvPr/>
-      </p:nvGrpSpPr>
-      <p:grpSpPr>
-        <a:xfrm>
-          <a:off x="0" y="0"/>
-          <a:ext cx="0" cy="0"/>
-          <a:chOff x="0" y="0"/>
-          <a:chExt cx="0" cy="0"/>
-        </a:xfrm>
-      </p:grpSpPr>
-      <p:sp>
-        <p:nvSpPr>
-          <p:cNvPr id="2" name="Folienbildplatzhalter 1"/>
-          <p:cNvSpPr>
-            <a:spLocks noGrp="1" noRot="1" noChangeAspect="1"/>
-          </p:cNvSpPr>
-          <p:nvPr>
-            <p:ph type="sldImg"/>
-          </p:nvPr>
-        </p:nvSpPr>
-        <p:spPr/>
-      </p:sp>
-      <p:sp>
-        <p:nvSpPr>
-          <p:cNvPr id="3" name="Notizenplatzhalter 2"/>
-          <p:cNvSpPr>
-            <a:spLocks noGrp="1"/>
-          </p:cNvSpPr>
-          <p:nvPr>
-            <p:ph type="body" idx="1"/>
-          </p:nvPr>
-        </p:nvSpPr>
-        <p:spPr/>
-        <p:txBody>
-          <a:bodyPr/>
-          <a:lstStyle/>
-          <a:p>
-            <a:endParaRPr lang="de-AT"/>
-          </a:p>
-        </p:txBody>
-      </p:sp>
-    </p:spTree>
-    <p:extLst>
-      <p:ext uri="{BB962C8B-B14F-4D97-AF65-F5344CB8AC3E}">
-        <p14:creationId xmlns:p14="http://schemas.microsoft.com/office/powerpoint/2010/main" val="31283559"/>
-      </p:ext>
-    </p:extLst>
-  </p:cSld>
-  <p:clrMapOvr>
-    <a:masterClrMapping/>
-  </p:clrMapOvr>
-</p:notes>
-</file>
-
-<file path=ppt/notesSlides/notesSlide39.xml><?xml version="1.0" encoding="utf-8"?>
-<p:notes xmlns:a="http://schemas.openxmlformats.org/drawingml/2006/main" xmlns:r="http://schemas.openxmlformats.org/officeDocument/2006/relationships" xmlns:p="http://schemas.openxmlformats.org/presentationml/2006/main">
-  <p:cSld>
-    <p:spTree>
-      <p:nvGrpSpPr>
-        <p:cNvPr id="1" name=""/>
-        <p:cNvGrpSpPr/>
-        <p:nvPr/>
-      </p:nvGrpSpPr>
-      <p:grpSpPr>
-        <a:xfrm>
-          <a:off x="0" y="0"/>
-          <a:ext cx="0" cy="0"/>
-          <a:chOff x="0" y="0"/>
-          <a:chExt cx="0" cy="0"/>
-        </a:xfrm>
-      </p:grpSpPr>
-      <p:sp>
-        <p:nvSpPr>
-          <p:cNvPr id="2" name="Folienbildplatzhalter 1"/>
-          <p:cNvSpPr>
-            <a:spLocks noGrp="1" noRot="1" noChangeAspect="1"/>
-          </p:cNvSpPr>
-          <p:nvPr>
-            <p:ph type="sldImg"/>
-          </p:nvPr>
-        </p:nvSpPr>
-        <p:spPr/>
-      </p:sp>
-      <p:sp>
-        <p:nvSpPr>
-          <p:cNvPr id="3" name="Notizenplatzhalter 2"/>
-          <p:cNvSpPr>
-            <a:spLocks noGrp="1"/>
-          </p:cNvSpPr>
-          <p:nvPr>
-            <p:ph type="body" idx="1"/>
-          </p:nvPr>
-        </p:nvSpPr>
-        <p:spPr/>
-        <p:txBody>
-          <a:bodyPr/>
-          <a:lstStyle/>
-          <a:p>
-            <a:endParaRPr lang="de-AT"/>
-          </a:p>
-        </p:txBody>
-      </p:sp>
-    </p:spTree>
-    <p:extLst>
-      <p:ext uri="{BB962C8B-B14F-4D97-AF65-F5344CB8AC3E}">
-        <p14:creationId xmlns:p14="http://schemas.microsoft.com/office/powerpoint/2010/main" val="478532606"/>
-      </p:ext>
-    </p:extLst>
-  </p:cSld>
-  <p:clrMapOvr>
-    <a:masterClrMapping/>
-  </p:clrMapOvr>
-</p:notes>
-</file>
-
 <file path=ppt/notesSlides/notesSlide4.xml><?xml version="1.0" encoding="utf-8"?>
 <p:notes xmlns:a="http://schemas.openxmlformats.org/drawingml/2006/main" xmlns:r="http://schemas.openxmlformats.org/officeDocument/2006/relationships" xmlns:p="http://schemas.openxmlformats.org/presentationml/2006/main">
   <p:cSld>
@@ -2809,128 +2683,6 @@
     <p:extLst>
       <p:ext uri="{BB962C8B-B14F-4D97-AF65-F5344CB8AC3E}">
         <p14:creationId xmlns:p14="http://schemas.microsoft.com/office/powerpoint/2010/main" val="1939852101"/>
-      </p:ext>
-    </p:extLst>
-  </p:cSld>
-  <p:clrMapOvr>
-    <a:masterClrMapping/>
-  </p:clrMapOvr>
-</p:notes>
-</file>
-
-<file path=ppt/notesSlides/notesSlide40.xml><?xml version="1.0" encoding="utf-8"?>
-<p:notes xmlns:a="http://schemas.openxmlformats.org/drawingml/2006/main" xmlns:r="http://schemas.openxmlformats.org/officeDocument/2006/relationships" xmlns:p="http://schemas.openxmlformats.org/presentationml/2006/main">
-  <p:cSld>
-    <p:spTree>
-      <p:nvGrpSpPr>
-        <p:cNvPr id="1" name=""/>
-        <p:cNvGrpSpPr/>
-        <p:nvPr/>
-      </p:nvGrpSpPr>
-      <p:grpSpPr>
-        <a:xfrm>
-          <a:off x="0" y="0"/>
-          <a:ext cx="0" cy="0"/>
-          <a:chOff x="0" y="0"/>
-          <a:chExt cx="0" cy="0"/>
-        </a:xfrm>
-      </p:grpSpPr>
-      <p:sp>
-        <p:nvSpPr>
-          <p:cNvPr id="2" name="Folienbildplatzhalter 1"/>
-          <p:cNvSpPr>
-            <a:spLocks noGrp="1" noRot="1" noChangeAspect="1"/>
-          </p:cNvSpPr>
-          <p:nvPr>
-            <p:ph type="sldImg"/>
-          </p:nvPr>
-        </p:nvSpPr>
-        <p:spPr/>
-      </p:sp>
-      <p:sp>
-        <p:nvSpPr>
-          <p:cNvPr id="3" name="Notizenplatzhalter 2"/>
-          <p:cNvSpPr>
-            <a:spLocks noGrp="1"/>
-          </p:cNvSpPr>
-          <p:nvPr>
-            <p:ph type="body" idx="1"/>
-          </p:nvPr>
-        </p:nvSpPr>
-        <p:spPr/>
-        <p:txBody>
-          <a:bodyPr/>
-          <a:lstStyle/>
-          <a:p>
-            <a:endParaRPr lang="de-AT"/>
-          </a:p>
-        </p:txBody>
-      </p:sp>
-    </p:spTree>
-    <p:extLst>
-      <p:ext uri="{BB962C8B-B14F-4D97-AF65-F5344CB8AC3E}">
-        <p14:creationId xmlns:p14="http://schemas.microsoft.com/office/powerpoint/2010/main" val="3934713078"/>
-      </p:ext>
-    </p:extLst>
-  </p:cSld>
-  <p:clrMapOvr>
-    <a:masterClrMapping/>
-  </p:clrMapOvr>
-</p:notes>
-</file>
-
-<file path=ppt/notesSlides/notesSlide41.xml><?xml version="1.0" encoding="utf-8"?>
-<p:notes xmlns:a="http://schemas.openxmlformats.org/drawingml/2006/main" xmlns:r="http://schemas.openxmlformats.org/officeDocument/2006/relationships" xmlns:p="http://schemas.openxmlformats.org/presentationml/2006/main">
-  <p:cSld>
-    <p:spTree>
-      <p:nvGrpSpPr>
-        <p:cNvPr id="1" name=""/>
-        <p:cNvGrpSpPr/>
-        <p:nvPr/>
-      </p:nvGrpSpPr>
-      <p:grpSpPr>
-        <a:xfrm>
-          <a:off x="0" y="0"/>
-          <a:ext cx="0" cy="0"/>
-          <a:chOff x="0" y="0"/>
-          <a:chExt cx="0" cy="0"/>
-        </a:xfrm>
-      </p:grpSpPr>
-      <p:sp>
-        <p:nvSpPr>
-          <p:cNvPr id="2" name="Folienbildplatzhalter 1"/>
-          <p:cNvSpPr>
-            <a:spLocks noGrp="1" noRot="1" noChangeAspect="1"/>
-          </p:cNvSpPr>
-          <p:nvPr>
-            <p:ph type="sldImg"/>
-          </p:nvPr>
-        </p:nvSpPr>
-        <p:spPr/>
-      </p:sp>
-      <p:sp>
-        <p:nvSpPr>
-          <p:cNvPr id="3" name="Notizenplatzhalter 2"/>
-          <p:cNvSpPr>
-            <a:spLocks noGrp="1"/>
-          </p:cNvSpPr>
-          <p:nvPr>
-            <p:ph type="body" idx="1"/>
-          </p:nvPr>
-        </p:nvSpPr>
-        <p:spPr/>
-        <p:txBody>
-          <a:bodyPr/>
-          <a:lstStyle/>
-          <a:p>
-            <a:endParaRPr lang="de-AT"/>
-          </a:p>
-        </p:txBody>
-      </p:sp>
-    </p:spTree>
-    <p:extLst>
-      <p:ext uri="{BB962C8B-B14F-4D97-AF65-F5344CB8AC3E}">
-        <p14:creationId xmlns:p14="http://schemas.microsoft.com/office/powerpoint/2010/main" val="1773257564"/>
       </p:ext>
     </p:extLst>
   </p:cSld>
@@ -3687,7 +3439,7 @@
           <a:p>
             <a:fld id="{6756A641-76DE-4586-94AB-E727D29482BD}" type="datetimeFigureOut">
               <a:rPr lang="de-AT" smtClean="0"/>
-              <a:t>18.04.2018</a:t>
+              <a:t>21.04.2018</a:t>
             </a:fld>
             <a:endParaRPr lang="de-AT"/>
           </a:p>
@@ -3857,7 +3609,7 @@
           <a:p>
             <a:fld id="{6756A641-76DE-4586-94AB-E727D29482BD}" type="datetimeFigureOut">
               <a:rPr lang="de-AT" smtClean="0"/>
-              <a:t>18.04.2018</a:t>
+              <a:t>21.04.2018</a:t>
             </a:fld>
             <a:endParaRPr lang="de-AT"/>
           </a:p>
@@ -4037,7 +3789,7 @@
           <a:p>
             <a:fld id="{6756A641-76DE-4586-94AB-E727D29482BD}" type="datetimeFigureOut">
               <a:rPr lang="de-AT" smtClean="0"/>
-              <a:t>18.04.2018</a:t>
+              <a:t>21.04.2018</a:t>
             </a:fld>
             <a:endParaRPr lang="de-AT"/>
           </a:p>
@@ -4369,7 +4121,7 @@
           <a:p>
             <a:fld id="{6756A641-76DE-4586-94AB-E727D29482BD}" type="datetimeFigureOut">
               <a:rPr lang="de-AT" smtClean="0"/>
-              <a:t>18.04.2018</a:t>
+              <a:t>21.04.2018</a:t>
             </a:fld>
             <a:endParaRPr lang="de-AT"/>
           </a:p>
@@ -4886,7 +4638,7 @@
           <a:p>
             <a:fld id="{C764DE79-268F-4C1A-8933-263129D2AF90}" type="datetimeFigureOut">
               <a:rPr lang="en-US" dirty="0"/>
-              <a:t>4/18/2018</a:t>
+              <a:t>4/21/2018</a:t>
             </a:fld>
             <a:endParaRPr lang="en-US" dirty="0"/>
           </a:p>
@@ -5118,7 +4870,7 @@
           <a:p>
             <a:fld id="{6756A641-76DE-4586-94AB-E727D29482BD}" type="datetimeFigureOut">
               <a:rPr lang="de-AT" smtClean="0"/>
-              <a:t>18.04.2018</a:t>
+              <a:t>21.04.2018</a:t>
             </a:fld>
             <a:endParaRPr lang="de-AT"/>
           </a:p>
@@ -5485,7 +5237,7 @@
           <a:p>
             <a:fld id="{6756A641-76DE-4586-94AB-E727D29482BD}" type="datetimeFigureOut">
               <a:rPr lang="de-AT" smtClean="0"/>
-              <a:t>18.04.2018</a:t>
+              <a:t>21.04.2018</a:t>
             </a:fld>
             <a:endParaRPr lang="de-AT"/>
           </a:p>
@@ -5603,7 +5355,7 @@
           <a:p>
             <a:fld id="{6756A641-76DE-4586-94AB-E727D29482BD}" type="datetimeFigureOut">
               <a:rPr lang="de-AT" smtClean="0"/>
-              <a:t>18.04.2018</a:t>
+              <a:t>21.04.2018</a:t>
             </a:fld>
             <a:endParaRPr lang="de-AT"/>
           </a:p>
@@ -5698,7 +5450,7 @@
           <a:p>
             <a:fld id="{6756A641-76DE-4586-94AB-E727D29482BD}" type="datetimeFigureOut">
               <a:rPr lang="de-AT" smtClean="0"/>
-              <a:t>18.04.2018</a:t>
+              <a:t>21.04.2018</a:t>
             </a:fld>
             <a:endParaRPr lang="de-AT"/>
           </a:p>
@@ -5975,7 +5727,7 @@
           <a:p>
             <a:fld id="{6756A641-76DE-4586-94AB-E727D29482BD}" type="datetimeFigureOut">
               <a:rPr lang="de-AT" smtClean="0"/>
-              <a:t>18.04.2018</a:t>
+              <a:t>21.04.2018</a:t>
             </a:fld>
             <a:endParaRPr lang="de-AT"/>
           </a:p>
@@ -6188,7 +5940,7 @@
           <a:p>
             <a:fld id="{6756A641-76DE-4586-94AB-E727D29482BD}" type="datetimeFigureOut">
               <a:rPr lang="de-AT" smtClean="0"/>
-              <a:t>18.04.2018</a:t>
+              <a:t>21.04.2018</a:t>
             </a:fld>
             <a:endParaRPr lang="de-AT"/>
           </a:p>
@@ -10255,13 +10007,13 @@
   <p:clrMapOvr>
     <a:masterClrMapping/>
   </p:clrMapOvr>
-  <mc:AlternateContent xmlns:mc="http://schemas.openxmlformats.org/markup-compatibility/2006">
-    <mc:Choice xmlns:p14="http://schemas.microsoft.com/office/powerpoint/2010/main" Requires="p14">
+  <mc:AlternateContent xmlns:mc="http://schemas.openxmlformats.org/markup-compatibility/2006" xmlns:p14="http://schemas.microsoft.com/office/powerpoint/2010/main">
+    <mc:Choice Requires="p14">
       <p:transition p14:dur="250">
         <p:fade/>
       </p:transition>
     </mc:Choice>
-    <mc:Fallback>
+    <mc:Fallback xmlns="">
       <p:transition>
         <p:fade/>
       </p:transition>
@@ -18637,106 +18389,6 @@
 </p:sld>
 </file>
 
-<file path=ppt/slides/slide39.xml><?xml version="1.0" encoding="utf-8"?>
-<p:sld xmlns:a="http://schemas.openxmlformats.org/drawingml/2006/main" xmlns:r="http://schemas.openxmlformats.org/officeDocument/2006/relationships" xmlns:p="http://schemas.openxmlformats.org/presentationml/2006/main" show="0">
-  <p:cSld>
-    <p:spTree>
-      <p:nvGrpSpPr>
-        <p:cNvPr id="1" name=""/>
-        <p:cNvGrpSpPr/>
-        <p:nvPr/>
-      </p:nvGrpSpPr>
-      <p:grpSpPr>
-        <a:xfrm>
-          <a:off x="0" y="0"/>
-          <a:ext cx="0" cy="0"/>
-          <a:chOff x="0" y="0"/>
-          <a:chExt cx="0" cy="0"/>
-        </a:xfrm>
-      </p:grpSpPr>
-      <p:sp>
-        <p:nvSpPr>
-          <p:cNvPr id="2" name="Titel 1">
-            <a:extLst>
-              <a:ext uri="{FF2B5EF4-FFF2-40B4-BE49-F238E27FC236}">
-                <a16:creationId xmlns:a16="http://schemas.microsoft.com/office/drawing/2014/main" id="{32464023-1EF2-440A-9687-CFCCAC7780B9}"/>
-              </a:ext>
-            </a:extLst>
-          </p:cNvPr>
-          <p:cNvSpPr>
-            <a:spLocks noGrp="1"/>
-          </p:cNvSpPr>
-          <p:nvPr>
-            <p:ph type="title"/>
-          </p:nvPr>
-        </p:nvSpPr>
-        <p:spPr/>
-        <p:txBody>
-          <a:bodyPr/>
-          <a:lstStyle/>
-          <a:p>
-            <a:r>
-              <a:rPr lang="en-US" dirty="0"/>
-              <a:t>Docker CLI</a:t>
-            </a:r>
-            <a:endParaRPr lang="de-AT" dirty="0"/>
-          </a:p>
-        </p:txBody>
-      </p:sp>
-      <p:sp>
-        <p:nvSpPr>
-          <p:cNvPr id="3" name="Inhaltsplatzhalter 2">
-            <a:extLst>
-              <a:ext uri="{FF2B5EF4-FFF2-40B4-BE49-F238E27FC236}">
-                <a16:creationId xmlns:a16="http://schemas.microsoft.com/office/drawing/2014/main" id="{354EB48F-138B-4041-9120-8567C1D245E0}"/>
-              </a:ext>
-            </a:extLst>
-          </p:cNvPr>
-          <p:cNvSpPr>
-            <a:spLocks noGrp="1"/>
-          </p:cNvSpPr>
-          <p:nvPr>
-            <p:ph idx="1"/>
-          </p:nvPr>
-        </p:nvSpPr>
-        <p:spPr/>
-        <p:txBody>
-          <a:bodyPr/>
-          <a:lstStyle/>
-          <a:p>
-            <a:r>
-              <a:rPr lang="en-US" dirty="0"/>
-              <a:t>run </a:t>
-            </a:r>
-            <a:r>
-              <a:rPr lang="en-US" dirty="0" err="1"/>
-              <a:t>Befehl</a:t>
-            </a:r>
-            <a:r>
-              <a:rPr lang="en-US" dirty="0"/>
-              <a:t> </a:t>
-            </a:r>
-            <a:r>
-              <a:rPr lang="en-US" dirty="0" err="1"/>
-              <a:t>erklären</a:t>
-            </a:r>
-            <a:endParaRPr lang="de-AT" dirty="0"/>
-          </a:p>
-        </p:txBody>
-      </p:sp>
-    </p:spTree>
-    <p:extLst>
-      <p:ext uri="{BB962C8B-B14F-4D97-AF65-F5344CB8AC3E}">
-        <p14:creationId xmlns:p14="http://schemas.microsoft.com/office/powerpoint/2010/main" val="3089165909"/>
-      </p:ext>
-    </p:extLst>
-  </p:cSld>
-  <p:clrMapOvr>
-    <a:masterClrMapping/>
-  </p:clrMapOvr>
-</p:sld>
-</file>
-
 <file path=ppt/slides/slide4.xml><?xml version="1.0" encoding="utf-8"?>
 <p:sld xmlns:a="http://schemas.openxmlformats.org/drawingml/2006/main" xmlns:r="http://schemas.openxmlformats.org/officeDocument/2006/relationships" xmlns:p="http://schemas.openxmlformats.org/presentationml/2006/main">
   <p:cSld>
@@ -18841,861 +18493,6 @@
   <p:transition spd="med">
     <p:push dir="u"/>
   </p:transition>
-</p:sld>
-</file>
-
-<file path=ppt/slides/slide40.xml><?xml version="1.0" encoding="utf-8"?>
-<p:sld xmlns:a="http://schemas.openxmlformats.org/drawingml/2006/main" xmlns:r="http://schemas.openxmlformats.org/officeDocument/2006/relationships" xmlns:p="http://schemas.openxmlformats.org/presentationml/2006/main" show="0">
-  <p:cSld>
-    <p:spTree>
-      <p:nvGrpSpPr>
-        <p:cNvPr id="1" name=""/>
-        <p:cNvGrpSpPr/>
-        <p:nvPr/>
-      </p:nvGrpSpPr>
-      <p:grpSpPr>
-        <a:xfrm>
-          <a:off x="0" y="0"/>
-          <a:ext cx="0" cy="0"/>
-          <a:chOff x="0" y="0"/>
-          <a:chExt cx="0" cy="0"/>
-        </a:xfrm>
-      </p:grpSpPr>
-      <p:sp>
-        <p:nvSpPr>
-          <p:cNvPr id="2" name="Titel 1">
-            <a:extLst>
-              <a:ext uri="{FF2B5EF4-FFF2-40B4-BE49-F238E27FC236}">
-                <a16:creationId xmlns:a16="http://schemas.microsoft.com/office/drawing/2014/main" id="{6724F2D5-0AD0-4E96-A478-858F4271D76B}"/>
-              </a:ext>
-            </a:extLst>
-          </p:cNvPr>
-          <p:cNvSpPr>
-            <a:spLocks noGrp="1"/>
-          </p:cNvSpPr>
-          <p:nvPr>
-            <p:ph type="title"/>
-          </p:nvPr>
-        </p:nvSpPr>
-        <p:spPr/>
-        <p:txBody>
-          <a:bodyPr/>
-          <a:lstStyle/>
-          <a:p>
-            <a:r>
-              <a:rPr lang="en-US" dirty="0" err="1"/>
-              <a:t>Powershell</a:t>
-            </a:r>
-            <a:r>
-              <a:rPr lang="en-US" dirty="0"/>
-              <a:t> und Docker</a:t>
-            </a:r>
-            <a:endParaRPr lang="de-AT" dirty="0"/>
-          </a:p>
-        </p:txBody>
-      </p:sp>
-      <p:sp>
-        <p:nvSpPr>
-          <p:cNvPr id="3" name="Inhaltsplatzhalter 2">
-            <a:extLst>
-              <a:ext uri="{FF2B5EF4-FFF2-40B4-BE49-F238E27FC236}">
-                <a16:creationId xmlns:a16="http://schemas.microsoft.com/office/drawing/2014/main" id="{F7E4DF78-A33D-4CA5-A8CF-201B0FAED734}"/>
-              </a:ext>
-            </a:extLst>
-          </p:cNvPr>
-          <p:cNvSpPr>
-            <a:spLocks noGrp="1"/>
-          </p:cNvSpPr>
-          <p:nvPr>
-            <p:ph idx="1"/>
-          </p:nvPr>
-        </p:nvSpPr>
-        <p:spPr>
-          <a:xfrm>
-            <a:off x="742484" y="1916484"/>
-            <a:ext cx="9314796" cy="1515085"/>
-          </a:xfrm>
-        </p:spPr>
-        <p:txBody>
-          <a:bodyPr/>
-          <a:lstStyle/>
-          <a:p>
-            <a:r>
-              <a:rPr lang="de-AT" dirty="0"/>
-              <a:t>Auto-</a:t>
-            </a:r>
-            <a:r>
-              <a:rPr lang="de-AT" dirty="0" err="1"/>
-              <a:t>Completion</a:t>
-            </a:r>
-            <a:r>
-              <a:rPr lang="de-AT" dirty="0"/>
-              <a:t>: </a:t>
-            </a:r>
-            <a:r>
-              <a:rPr lang="de-AT" dirty="0">
-                <a:hlinkClick r:id="rId3"/>
-              </a:rPr>
-              <a:t>https://github.com/samneirinck/posh-docker</a:t>
-            </a:r>
-            <a:endParaRPr lang="de-AT" dirty="0"/>
-          </a:p>
-          <a:p>
-            <a:r>
-              <a:rPr lang="de-AT" dirty="0"/>
-              <a:t>Erstellen von Docker-Aliasen:</a:t>
-            </a:r>
-          </a:p>
-        </p:txBody>
-      </p:sp>
-      <p:sp>
-        <p:nvSpPr>
-          <p:cNvPr id="4" name="Rechteck 3">
-            <a:extLst>
-              <a:ext uri="{FF2B5EF4-FFF2-40B4-BE49-F238E27FC236}">
-                <a16:creationId xmlns:a16="http://schemas.microsoft.com/office/drawing/2014/main" id="{5F5E87E8-EC4D-4A7F-A780-B3890C8F3CBD}"/>
-              </a:ext>
-            </a:extLst>
-          </p:cNvPr>
-          <p:cNvSpPr/>
-          <p:nvPr/>
-        </p:nvSpPr>
-        <p:spPr>
-          <a:xfrm>
-            <a:off x="1026783" y="3431569"/>
-            <a:ext cx="5733613" cy="3170099"/>
-          </a:xfrm>
-          <a:prstGeom prst="rect">
-            <a:avLst/>
-          </a:prstGeom>
-        </p:spPr>
-        <p:txBody>
-          <a:bodyPr wrap="square">
-            <a:spAutoFit/>
-          </a:bodyPr>
-          <a:lstStyle/>
-          <a:p>
-            <a:r>
-              <a:rPr lang="de-AT" sz="2000" dirty="0" err="1">
-                <a:latin typeface="Fira Code" panose="020B0509050000020004" pitchFamily="49" charset="0"/>
-                <a:ea typeface="Fira Code" panose="020B0509050000020004" pitchFamily="49" charset="0"/>
-              </a:rPr>
-              <a:t>function</a:t>
-            </a:r>
-            <a:r>
-              <a:rPr lang="de-AT" sz="2000" dirty="0">
-                <a:latin typeface="Fira Code" panose="020B0509050000020004" pitchFamily="49" charset="0"/>
-                <a:ea typeface="Fira Code" panose="020B0509050000020004" pitchFamily="49" charset="0"/>
-              </a:rPr>
-              <a:t> </a:t>
-            </a:r>
-            <a:r>
-              <a:rPr lang="de-AT" sz="2000" dirty="0" err="1">
-                <a:latin typeface="Fira Code" panose="020B0509050000020004" pitchFamily="49" charset="0"/>
-                <a:ea typeface="Fira Code" panose="020B0509050000020004" pitchFamily="49" charset="0"/>
-              </a:rPr>
-              <a:t>jekyll</a:t>
-            </a:r>
-            <a:r>
-              <a:rPr lang="de-AT" sz="2000" dirty="0">
-                <a:latin typeface="Fira Code" panose="020B0509050000020004" pitchFamily="49" charset="0"/>
-                <a:ea typeface="Fira Code" panose="020B0509050000020004" pitchFamily="49" charset="0"/>
-              </a:rPr>
-              <a:t> {</a:t>
-            </a:r>
-          </a:p>
-          <a:p>
-            <a:r>
-              <a:rPr lang="de-AT" sz="2000" dirty="0">
-                <a:latin typeface="Fira Code" panose="020B0509050000020004" pitchFamily="49" charset="0"/>
-                <a:ea typeface="Fira Code" panose="020B0509050000020004" pitchFamily="49" charset="0"/>
-              </a:rPr>
-              <a:t>	</a:t>
-            </a:r>
-            <a:r>
-              <a:rPr lang="de-AT" sz="2000" dirty="0" err="1">
-                <a:latin typeface="Fira Code" panose="020B0509050000020004" pitchFamily="49" charset="0"/>
-                <a:ea typeface="Fira Code" panose="020B0509050000020004" pitchFamily="49" charset="0"/>
-              </a:rPr>
-              <a:t>docker</a:t>
-            </a:r>
-            <a:r>
-              <a:rPr lang="de-AT" sz="2000" dirty="0">
-                <a:latin typeface="Fira Code" panose="020B0509050000020004" pitchFamily="49" charset="0"/>
-                <a:ea typeface="Fira Code" panose="020B0509050000020004" pitchFamily="49" charset="0"/>
-              </a:rPr>
-              <a:t> </a:t>
-            </a:r>
-            <a:r>
-              <a:rPr lang="de-AT" sz="2000" dirty="0" err="1">
-                <a:latin typeface="Fira Code" panose="020B0509050000020004" pitchFamily="49" charset="0"/>
-                <a:ea typeface="Fira Code" panose="020B0509050000020004" pitchFamily="49" charset="0"/>
-              </a:rPr>
-              <a:t>run</a:t>
-            </a:r>
-            <a:endParaRPr lang="de-AT" sz="2000" dirty="0">
-              <a:latin typeface="Fira Code" panose="020B0509050000020004" pitchFamily="49" charset="0"/>
-              <a:ea typeface="Fira Code" panose="020B0509050000020004" pitchFamily="49" charset="0"/>
-            </a:endParaRPr>
-          </a:p>
-          <a:p>
-            <a:r>
-              <a:rPr lang="de-AT" sz="2000" dirty="0">
-                <a:latin typeface="Fira Code" panose="020B0509050000020004" pitchFamily="49" charset="0"/>
-                <a:ea typeface="Fira Code" panose="020B0509050000020004" pitchFamily="49" charset="0"/>
-              </a:rPr>
-              <a:t>		-</a:t>
-            </a:r>
-            <a:r>
-              <a:rPr lang="de-AT" sz="2000" dirty="0" err="1">
-                <a:latin typeface="Fira Code" panose="020B0509050000020004" pitchFamily="49" charset="0"/>
-                <a:ea typeface="Fira Code" panose="020B0509050000020004" pitchFamily="49" charset="0"/>
-              </a:rPr>
-              <a:t>it</a:t>
-            </a:r>
-            <a:endParaRPr lang="de-AT" sz="2000" dirty="0">
-              <a:latin typeface="Fira Code" panose="020B0509050000020004" pitchFamily="49" charset="0"/>
-              <a:ea typeface="Fira Code" panose="020B0509050000020004" pitchFamily="49" charset="0"/>
-            </a:endParaRPr>
-          </a:p>
-          <a:p>
-            <a:r>
-              <a:rPr lang="de-AT" sz="2000" dirty="0">
-                <a:latin typeface="Fira Code" panose="020B0509050000020004" pitchFamily="49" charset="0"/>
-                <a:ea typeface="Fira Code" panose="020B0509050000020004" pitchFamily="49" charset="0"/>
-              </a:rPr>
-              <a:t>		--</a:t>
-            </a:r>
-            <a:r>
-              <a:rPr lang="de-AT" sz="2000" dirty="0" err="1">
-                <a:latin typeface="Fira Code" panose="020B0509050000020004" pitchFamily="49" charset="0"/>
-                <a:ea typeface="Fira Code" panose="020B0509050000020004" pitchFamily="49" charset="0"/>
-              </a:rPr>
-              <a:t>rm</a:t>
-            </a:r>
-            <a:endParaRPr lang="de-AT" sz="2000" dirty="0">
-              <a:latin typeface="Fira Code" panose="020B0509050000020004" pitchFamily="49" charset="0"/>
-              <a:ea typeface="Fira Code" panose="020B0509050000020004" pitchFamily="49" charset="0"/>
-            </a:endParaRPr>
-          </a:p>
-          <a:p>
-            <a:r>
-              <a:rPr lang="de-AT" sz="2000" dirty="0">
-                <a:latin typeface="Fira Code" panose="020B0509050000020004" pitchFamily="49" charset="0"/>
-                <a:ea typeface="Fira Code" panose="020B0509050000020004" pitchFamily="49" charset="0"/>
-              </a:rPr>
-              <a:t>		-v ${</a:t>
-            </a:r>
-            <a:r>
-              <a:rPr lang="de-AT" sz="2000" dirty="0" err="1">
-                <a:latin typeface="Fira Code" panose="020B0509050000020004" pitchFamily="49" charset="0"/>
-                <a:ea typeface="Fira Code" panose="020B0509050000020004" pitchFamily="49" charset="0"/>
-              </a:rPr>
-              <a:t>pwd</a:t>
-            </a:r>
-            <a:r>
-              <a:rPr lang="de-AT" sz="2000" dirty="0">
-                <a:latin typeface="Fira Code" panose="020B0509050000020004" pitchFamily="49" charset="0"/>
-                <a:ea typeface="Fira Code" panose="020B0509050000020004" pitchFamily="49" charset="0"/>
-              </a:rPr>
-              <a:t>}:/</a:t>
-            </a:r>
-            <a:r>
-              <a:rPr lang="de-AT" sz="2000" dirty="0" err="1">
-                <a:latin typeface="Fira Code" panose="020B0509050000020004" pitchFamily="49" charset="0"/>
-                <a:ea typeface="Fira Code" panose="020B0509050000020004" pitchFamily="49" charset="0"/>
-              </a:rPr>
-              <a:t>srv</a:t>
-            </a:r>
-            <a:r>
-              <a:rPr lang="de-AT" sz="2000" dirty="0">
-                <a:latin typeface="Fira Code" panose="020B0509050000020004" pitchFamily="49" charset="0"/>
-                <a:ea typeface="Fira Code" panose="020B0509050000020004" pitchFamily="49" charset="0"/>
-              </a:rPr>
-              <a:t>/</a:t>
-            </a:r>
-            <a:r>
-              <a:rPr lang="de-AT" sz="2000" dirty="0" err="1">
-                <a:latin typeface="Fira Code" panose="020B0509050000020004" pitchFamily="49" charset="0"/>
-                <a:ea typeface="Fira Code" panose="020B0509050000020004" pitchFamily="49" charset="0"/>
-              </a:rPr>
-              <a:t>jekyll</a:t>
-            </a:r>
-            <a:endParaRPr lang="de-AT" sz="2000" dirty="0">
-              <a:latin typeface="Fira Code" panose="020B0509050000020004" pitchFamily="49" charset="0"/>
-              <a:ea typeface="Fira Code" panose="020B0509050000020004" pitchFamily="49" charset="0"/>
-            </a:endParaRPr>
-          </a:p>
-          <a:p>
-            <a:r>
-              <a:rPr lang="de-AT" sz="2000" dirty="0">
-                <a:latin typeface="Fira Code" panose="020B0509050000020004" pitchFamily="49" charset="0"/>
-                <a:ea typeface="Fira Code" panose="020B0509050000020004" pitchFamily="49" charset="0"/>
-              </a:rPr>
-              <a:t>		-p 4000:4000</a:t>
-            </a:r>
-          </a:p>
-          <a:p>
-            <a:r>
-              <a:rPr lang="de-AT" sz="2000" dirty="0">
-                <a:latin typeface="Fira Code" panose="020B0509050000020004" pitchFamily="49" charset="0"/>
-                <a:ea typeface="Fira Code" panose="020B0509050000020004" pitchFamily="49" charset="0"/>
-              </a:rPr>
-              <a:t>		-e POLLING=</a:t>
-            </a:r>
-            <a:r>
-              <a:rPr lang="de-AT" sz="2000" dirty="0" err="1">
-                <a:latin typeface="Fira Code" panose="020B0509050000020004" pitchFamily="49" charset="0"/>
-                <a:ea typeface="Fira Code" panose="020B0509050000020004" pitchFamily="49" charset="0"/>
-              </a:rPr>
-              <a:t>true</a:t>
-            </a:r>
-            <a:endParaRPr lang="de-AT" sz="2000" dirty="0">
-              <a:latin typeface="Fira Code" panose="020B0509050000020004" pitchFamily="49" charset="0"/>
-              <a:ea typeface="Fira Code" panose="020B0509050000020004" pitchFamily="49" charset="0"/>
-            </a:endParaRPr>
-          </a:p>
-          <a:p>
-            <a:r>
-              <a:rPr lang="de-AT" sz="2000" dirty="0">
-                <a:latin typeface="Fira Code" panose="020B0509050000020004" pitchFamily="49" charset="0"/>
-                <a:ea typeface="Fira Code" panose="020B0509050000020004" pitchFamily="49" charset="0"/>
-              </a:rPr>
-              <a:t>		</a:t>
-            </a:r>
-            <a:r>
-              <a:rPr lang="de-AT" sz="2000" dirty="0" err="1">
-                <a:latin typeface="Fira Code" panose="020B0509050000020004" pitchFamily="49" charset="0"/>
-                <a:ea typeface="Fira Code" panose="020B0509050000020004" pitchFamily="49" charset="0"/>
-              </a:rPr>
-              <a:t>jekyll</a:t>
-            </a:r>
-            <a:r>
-              <a:rPr lang="de-AT" sz="2000" dirty="0">
-                <a:latin typeface="Fira Code" panose="020B0509050000020004" pitchFamily="49" charset="0"/>
-                <a:ea typeface="Fira Code" panose="020B0509050000020004" pitchFamily="49" charset="0"/>
-              </a:rPr>
-              <a:t>/</a:t>
-            </a:r>
-            <a:r>
-              <a:rPr lang="de-AT" sz="2000" dirty="0" err="1">
-                <a:latin typeface="Fira Code" panose="020B0509050000020004" pitchFamily="49" charset="0"/>
-                <a:ea typeface="Fira Code" panose="020B0509050000020004" pitchFamily="49" charset="0"/>
-              </a:rPr>
-              <a:t>jekyll</a:t>
-            </a:r>
-            <a:endParaRPr lang="de-AT" sz="2000" dirty="0">
-              <a:latin typeface="Fira Code" panose="020B0509050000020004" pitchFamily="49" charset="0"/>
-              <a:ea typeface="Fira Code" panose="020B0509050000020004" pitchFamily="49" charset="0"/>
-            </a:endParaRPr>
-          </a:p>
-          <a:p>
-            <a:r>
-              <a:rPr lang="de-AT" sz="2000" dirty="0">
-                <a:latin typeface="Fira Code" panose="020B0509050000020004" pitchFamily="49" charset="0"/>
-                <a:ea typeface="Fira Code" panose="020B0509050000020004" pitchFamily="49" charset="0"/>
-              </a:rPr>
-              <a:t>		/</a:t>
-            </a:r>
-            <a:r>
-              <a:rPr lang="de-AT" sz="2000" dirty="0" err="1">
-                <a:latin typeface="Fira Code" panose="020B0509050000020004" pitchFamily="49" charset="0"/>
-                <a:ea typeface="Fira Code" panose="020B0509050000020004" pitchFamily="49" charset="0"/>
-              </a:rPr>
-              <a:t>usr</a:t>
-            </a:r>
-            <a:r>
-              <a:rPr lang="de-AT" sz="2000" dirty="0">
-                <a:latin typeface="Fira Code" panose="020B0509050000020004" pitchFamily="49" charset="0"/>
-                <a:ea typeface="Fira Code" panose="020B0509050000020004" pitchFamily="49" charset="0"/>
-              </a:rPr>
-              <a:t>/</a:t>
-            </a:r>
-            <a:r>
-              <a:rPr lang="de-AT" sz="2000" dirty="0" err="1">
-                <a:latin typeface="Fira Code" panose="020B0509050000020004" pitchFamily="49" charset="0"/>
-                <a:ea typeface="Fira Code" panose="020B0509050000020004" pitchFamily="49" charset="0"/>
-              </a:rPr>
-              <a:t>local</a:t>
-            </a:r>
-            <a:r>
-              <a:rPr lang="de-AT" sz="2000" dirty="0">
-                <a:latin typeface="Fira Code" panose="020B0509050000020004" pitchFamily="49" charset="0"/>
-                <a:ea typeface="Fira Code" panose="020B0509050000020004" pitchFamily="49" charset="0"/>
-              </a:rPr>
-              <a:t>/bin/</a:t>
-            </a:r>
-            <a:r>
-              <a:rPr lang="de-AT" sz="2000" dirty="0" err="1">
-                <a:latin typeface="Fira Code" panose="020B0509050000020004" pitchFamily="49" charset="0"/>
-                <a:ea typeface="Fira Code" panose="020B0509050000020004" pitchFamily="49" charset="0"/>
-              </a:rPr>
-              <a:t>jekyll</a:t>
-            </a:r>
-            <a:r>
-              <a:rPr lang="de-AT" sz="2000" dirty="0">
-                <a:latin typeface="Fira Code" panose="020B0509050000020004" pitchFamily="49" charset="0"/>
-                <a:ea typeface="Fira Code" panose="020B0509050000020004" pitchFamily="49" charset="0"/>
-              </a:rPr>
-              <a:t> ${</a:t>
-            </a:r>
-            <a:r>
-              <a:rPr lang="de-AT" sz="2000" dirty="0" err="1">
-                <a:latin typeface="Fira Code" panose="020B0509050000020004" pitchFamily="49" charset="0"/>
-                <a:ea typeface="Fira Code" panose="020B0509050000020004" pitchFamily="49" charset="0"/>
-              </a:rPr>
-              <a:t>args</a:t>
-            </a:r>
-            <a:r>
-              <a:rPr lang="de-AT" sz="2000" dirty="0">
-                <a:latin typeface="Fira Code" panose="020B0509050000020004" pitchFamily="49" charset="0"/>
-                <a:ea typeface="Fira Code" panose="020B0509050000020004" pitchFamily="49" charset="0"/>
-              </a:rPr>
-              <a:t>}</a:t>
-            </a:r>
-          </a:p>
-          <a:p>
-            <a:r>
-              <a:rPr lang="de-AT" sz="2000" dirty="0">
-                <a:latin typeface="Fira Code" panose="020B0509050000020004" pitchFamily="49" charset="0"/>
-                <a:ea typeface="Fira Code" panose="020B0509050000020004" pitchFamily="49" charset="0"/>
-              </a:rPr>
-              <a:t>}</a:t>
-            </a:r>
-          </a:p>
-        </p:txBody>
-      </p:sp>
-    </p:spTree>
-    <p:extLst>
-      <p:ext uri="{BB962C8B-B14F-4D97-AF65-F5344CB8AC3E}">
-        <p14:creationId xmlns:p14="http://schemas.microsoft.com/office/powerpoint/2010/main" val="2463589676"/>
-      </p:ext>
-    </p:extLst>
-  </p:cSld>
-  <p:clrMapOvr>
-    <a:masterClrMapping/>
-  </p:clrMapOvr>
-  <p:transition spd="slow">
-    <p:push dir="u"/>
-  </p:transition>
-</p:sld>
-</file>
-
-<file path=ppt/slides/slide41.xml><?xml version="1.0" encoding="utf-8"?>
-<p:sld xmlns:a="http://schemas.openxmlformats.org/drawingml/2006/main" xmlns:r="http://schemas.openxmlformats.org/officeDocument/2006/relationships" xmlns:p="http://schemas.openxmlformats.org/presentationml/2006/main" show="0">
-  <p:cSld>
-    <p:spTree>
-      <p:nvGrpSpPr>
-        <p:cNvPr id="1" name=""/>
-        <p:cNvGrpSpPr/>
-        <p:nvPr/>
-      </p:nvGrpSpPr>
-      <p:grpSpPr>
-        <a:xfrm>
-          <a:off x="0" y="0"/>
-          <a:ext cx="0" cy="0"/>
-          <a:chOff x="0" y="0"/>
-          <a:chExt cx="0" cy="0"/>
-        </a:xfrm>
-      </p:grpSpPr>
-      <p:sp>
-        <p:nvSpPr>
-          <p:cNvPr id="2" name="Titel 1">
-            <a:extLst>
-              <a:ext uri="{FF2B5EF4-FFF2-40B4-BE49-F238E27FC236}">
-                <a16:creationId xmlns:a16="http://schemas.microsoft.com/office/drawing/2014/main" id="{612B3E80-6F9B-414D-BCAA-8640DD3CDDF3}"/>
-              </a:ext>
-            </a:extLst>
-          </p:cNvPr>
-          <p:cNvSpPr>
-            <a:spLocks noGrp="1"/>
-          </p:cNvSpPr>
-          <p:nvPr>
-            <p:ph type="title"/>
-          </p:nvPr>
-        </p:nvSpPr>
-        <p:spPr/>
-        <p:txBody>
-          <a:bodyPr/>
-          <a:lstStyle/>
-          <a:p>
-            <a:r>
-              <a:rPr lang="en-US" dirty="0">
-                <a:solidFill>
-                  <a:srgbClr val="FF0000"/>
-                </a:solidFill>
-              </a:rPr>
-              <a:t>Container interactive daemon</a:t>
-            </a:r>
-            <a:endParaRPr lang="de-AT" dirty="0">
-              <a:solidFill>
-                <a:srgbClr val="FF0000"/>
-              </a:solidFill>
-            </a:endParaRPr>
-          </a:p>
-        </p:txBody>
-      </p:sp>
-      <p:sp>
-        <p:nvSpPr>
-          <p:cNvPr id="3" name="Inhaltsplatzhalter 2">
-            <a:extLst>
-              <a:ext uri="{FF2B5EF4-FFF2-40B4-BE49-F238E27FC236}">
-                <a16:creationId xmlns:a16="http://schemas.microsoft.com/office/drawing/2014/main" id="{C14803E8-41C6-4A89-9898-D94DE84E21B7}"/>
-              </a:ext>
-            </a:extLst>
-          </p:cNvPr>
-          <p:cNvSpPr>
-            <a:spLocks noGrp="1"/>
-          </p:cNvSpPr>
-          <p:nvPr>
-            <p:ph idx="1"/>
-          </p:nvPr>
-        </p:nvSpPr>
-        <p:spPr/>
-        <p:txBody>
-          <a:bodyPr/>
-          <a:lstStyle/>
-          <a:p>
-            <a:endParaRPr lang="de-AT"/>
-          </a:p>
-        </p:txBody>
-      </p:sp>
-    </p:spTree>
-    <p:extLst>
-      <p:ext uri="{BB962C8B-B14F-4D97-AF65-F5344CB8AC3E}">
-        <p14:creationId xmlns:p14="http://schemas.microsoft.com/office/powerpoint/2010/main" val="2261142164"/>
-      </p:ext>
-    </p:extLst>
-  </p:cSld>
-  <p:clrMapOvr>
-    <a:masterClrMapping/>
-  </p:clrMapOvr>
-</p:sld>
-</file>
-
-<file path=ppt/slides/slide42.xml><?xml version="1.0" encoding="utf-8"?>
-<p:sld xmlns:a="http://schemas.openxmlformats.org/drawingml/2006/main" xmlns:r="http://schemas.openxmlformats.org/officeDocument/2006/relationships" xmlns:p="http://schemas.openxmlformats.org/presentationml/2006/main" show="0">
-  <p:cSld>
-    <p:spTree>
-      <p:nvGrpSpPr>
-        <p:cNvPr id="1" name=""/>
-        <p:cNvGrpSpPr/>
-        <p:nvPr/>
-      </p:nvGrpSpPr>
-      <p:grpSpPr>
-        <a:xfrm>
-          <a:off x="0" y="0"/>
-          <a:ext cx="0" cy="0"/>
-          <a:chOff x="0" y="0"/>
-          <a:chExt cx="0" cy="0"/>
-        </a:xfrm>
-      </p:grpSpPr>
-      <p:sp>
-        <p:nvSpPr>
-          <p:cNvPr id="2" name="Titel 1">
-            <a:extLst>
-              <a:ext uri="{FF2B5EF4-FFF2-40B4-BE49-F238E27FC236}">
-                <a16:creationId xmlns:a16="http://schemas.microsoft.com/office/drawing/2014/main" id="{F23F65D7-723D-4DE7-B010-8FF3F5914F80}"/>
-              </a:ext>
-            </a:extLst>
-          </p:cNvPr>
-          <p:cNvSpPr>
-            <a:spLocks noGrp="1"/>
-          </p:cNvSpPr>
-          <p:nvPr>
-            <p:ph type="title"/>
-          </p:nvPr>
-        </p:nvSpPr>
-        <p:spPr/>
-        <p:txBody>
-          <a:bodyPr/>
-          <a:lstStyle/>
-          <a:p>
-            <a:r>
-              <a:rPr lang="en-US" dirty="0"/>
-              <a:t>docker-compose II</a:t>
-            </a:r>
-            <a:endParaRPr lang="de-AT" dirty="0"/>
-          </a:p>
-        </p:txBody>
-      </p:sp>
-      <p:sp>
-        <p:nvSpPr>
-          <p:cNvPr id="4" name="Rechteck 3">
-            <a:extLst>
-              <a:ext uri="{FF2B5EF4-FFF2-40B4-BE49-F238E27FC236}">
-                <a16:creationId xmlns:a16="http://schemas.microsoft.com/office/drawing/2014/main" id="{3EBE114C-322D-4D85-8AF0-AF19816E9160}"/>
-              </a:ext>
-            </a:extLst>
-          </p:cNvPr>
-          <p:cNvSpPr/>
-          <p:nvPr/>
-        </p:nvSpPr>
-        <p:spPr>
-          <a:xfrm>
-            <a:off x="1672923" y="1774833"/>
-            <a:ext cx="5397500" cy="4524315"/>
-          </a:xfrm>
-          <a:prstGeom prst="rect">
-            <a:avLst/>
-          </a:prstGeom>
-        </p:spPr>
-        <p:txBody>
-          <a:bodyPr>
-            <a:spAutoFit/>
-          </a:bodyPr>
-          <a:lstStyle/>
-          <a:p>
-            <a:r>
-              <a:rPr lang="fr-FR" dirty="0">
-                <a:solidFill>
-                  <a:schemeClr val="bg1">
-                    <a:lumMod val="50000"/>
-                  </a:schemeClr>
-                </a:solidFill>
-                <a:latin typeface="Fira Code" panose="020B0509050000020004" pitchFamily="49" charset="0"/>
-                <a:ea typeface="Fira Code" panose="020B0509050000020004" pitchFamily="49" charset="0"/>
-              </a:rPr>
-              <a:t># docker-</a:t>
-            </a:r>
-            <a:r>
-              <a:rPr lang="fr-FR" dirty="0" err="1">
-                <a:solidFill>
-                  <a:schemeClr val="bg1">
-                    <a:lumMod val="50000"/>
-                  </a:schemeClr>
-                </a:solidFill>
-                <a:latin typeface="Fira Code" panose="020B0509050000020004" pitchFamily="49" charset="0"/>
-                <a:ea typeface="Fira Code" panose="020B0509050000020004" pitchFamily="49" charset="0"/>
-              </a:rPr>
-              <a:t>compose.yaml</a:t>
-            </a:r>
-            <a:endParaRPr lang="fr-FR" dirty="0">
-              <a:solidFill>
-                <a:schemeClr val="bg1">
-                  <a:lumMod val="50000"/>
-                </a:schemeClr>
-              </a:solidFill>
-              <a:latin typeface="Fira Code" panose="020B0509050000020004" pitchFamily="49" charset="0"/>
-              <a:ea typeface="Fira Code" panose="020B0509050000020004" pitchFamily="49" charset="0"/>
-            </a:endParaRPr>
-          </a:p>
-          <a:p>
-            <a:r>
-              <a:rPr lang="fr-FR" dirty="0">
-                <a:solidFill>
-                  <a:srgbClr val="0C5176"/>
-                </a:solidFill>
-                <a:latin typeface="Fira Code" panose="020B0509050000020004" pitchFamily="49" charset="0"/>
-                <a:ea typeface="Fira Code" panose="020B0509050000020004" pitchFamily="49" charset="0"/>
-              </a:rPr>
-              <a:t>version: '3'</a:t>
-            </a:r>
-          </a:p>
-          <a:p>
-            <a:r>
-              <a:rPr lang="fr-FR" dirty="0">
-                <a:solidFill>
-                  <a:srgbClr val="0C5176"/>
-                </a:solidFill>
-                <a:latin typeface="Fira Code" panose="020B0509050000020004" pitchFamily="49" charset="0"/>
-                <a:ea typeface="Fira Code" panose="020B0509050000020004" pitchFamily="49" charset="0"/>
-              </a:rPr>
-              <a:t>services:</a:t>
-            </a:r>
-          </a:p>
-          <a:p>
-            <a:r>
-              <a:rPr lang="fr-FR" dirty="0">
-                <a:solidFill>
-                  <a:srgbClr val="0C5176"/>
-                </a:solidFill>
-                <a:latin typeface="Fira Code" panose="020B0509050000020004" pitchFamily="49" charset="0"/>
-                <a:ea typeface="Fira Code" panose="020B0509050000020004" pitchFamily="49" charset="0"/>
-              </a:rPr>
-              <a:t>  web:</a:t>
-            </a:r>
-          </a:p>
-          <a:p>
-            <a:r>
-              <a:rPr lang="fr-FR" dirty="0">
-                <a:solidFill>
-                  <a:srgbClr val="0C5176"/>
-                </a:solidFill>
-                <a:latin typeface="Fira Code" panose="020B0509050000020004" pitchFamily="49" charset="0"/>
-                <a:ea typeface="Fira Code" panose="020B0509050000020004" pitchFamily="49" charset="0"/>
-              </a:rPr>
-              <a:t>    </a:t>
-            </a:r>
-            <a:r>
-              <a:rPr lang="fr-FR" dirty="0" err="1">
-                <a:solidFill>
-                  <a:srgbClr val="0C5176"/>
-                </a:solidFill>
-                <a:latin typeface="Fira Code" panose="020B0509050000020004" pitchFamily="49" charset="0"/>
-                <a:ea typeface="Fira Code" panose="020B0509050000020004" pitchFamily="49" charset="0"/>
-              </a:rPr>
-              <a:t>build</a:t>
-            </a:r>
-            <a:r>
-              <a:rPr lang="fr-FR" dirty="0">
-                <a:solidFill>
-                  <a:srgbClr val="0C5176"/>
-                </a:solidFill>
-                <a:latin typeface="Fira Code" panose="020B0509050000020004" pitchFamily="49" charset="0"/>
-                <a:ea typeface="Fira Code" panose="020B0509050000020004" pitchFamily="49" charset="0"/>
-              </a:rPr>
-              <a:t>: .</a:t>
-            </a:r>
-          </a:p>
-          <a:p>
-            <a:r>
-              <a:rPr lang="fr-FR" dirty="0">
-                <a:solidFill>
-                  <a:srgbClr val="0C5176"/>
-                </a:solidFill>
-                <a:latin typeface="Fira Code" panose="020B0509050000020004" pitchFamily="49" charset="0"/>
-                <a:ea typeface="Fira Code" panose="020B0509050000020004" pitchFamily="49" charset="0"/>
-              </a:rPr>
-              <a:t>    ports:</a:t>
-            </a:r>
-          </a:p>
-          <a:p>
-            <a:r>
-              <a:rPr lang="fr-FR" dirty="0">
-                <a:solidFill>
-                  <a:srgbClr val="0C5176"/>
-                </a:solidFill>
-                <a:latin typeface="Fira Code" panose="020B0509050000020004" pitchFamily="49" charset="0"/>
-                <a:ea typeface="Fira Code" panose="020B0509050000020004" pitchFamily="49" charset="0"/>
-              </a:rPr>
-              <a:t>    - "5000:5000"</a:t>
-            </a:r>
-          </a:p>
-          <a:p>
-            <a:r>
-              <a:rPr lang="fr-FR" dirty="0">
-                <a:solidFill>
-                  <a:srgbClr val="0C5176"/>
-                </a:solidFill>
-                <a:latin typeface="Fira Code" panose="020B0509050000020004" pitchFamily="49" charset="0"/>
-                <a:ea typeface="Fira Code" panose="020B0509050000020004" pitchFamily="49" charset="0"/>
-              </a:rPr>
-              <a:t>    volumes:</a:t>
-            </a:r>
-          </a:p>
-          <a:p>
-            <a:r>
-              <a:rPr lang="fr-FR" dirty="0">
-                <a:solidFill>
-                  <a:srgbClr val="0C5176"/>
-                </a:solidFill>
-                <a:latin typeface="Fira Code" panose="020B0509050000020004" pitchFamily="49" charset="0"/>
-                <a:ea typeface="Fira Code" panose="020B0509050000020004" pitchFamily="49" charset="0"/>
-              </a:rPr>
-              <a:t>    - .:/code</a:t>
-            </a:r>
-          </a:p>
-          <a:p>
-            <a:r>
-              <a:rPr lang="fr-FR" dirty="0">
-                <a:solidFill>
-                  <a:srgbClr val="0C5176"/>
-                </a:solidFill>
-                <a:latin typeface="Fira Code" panose="020B0509050000020004" pitchFamily="49" charset="0"/>
-                <a:ea typeface="Fira Code" panose="020B0509050000020004" pitchFamily="49" charset="0"/>
-              </a:rPr>
-              <a:t>    - logvolume01:/var/log</a:t>
-            </a:r>
-          </a:p>
-          <a:p>
-            <a:r>
-              <a:rPr lang="fr-FR" dirty="0">
-                <a:solidFill>
-                  <a:srgbClr val="0C5176"/>
-                </a:solidFill>
-                <a:latin typeface="Fira Code" panose="020B0509050000020004" pitchFamily="49" charset="0"/>
-                <a:ea typeface="Fira Code" panose="020B0509050000020004" pitchFamily="49" charset="0"/>
-              </a:rPr>
-              <a:t>    links:</a:t>
-            </a:r>
-          </a:p>
-          <a:p>
-            <a:r>
-              <a:rPr lang="fr-FR" dirty="0">
-                <a:solidFill>
-                  <a:srgbClr val="0C5176"/>
-                </a:solidFill>
-                <a:latin typeface="Fira Code" panose="020B0509050000020004" pitchFamily="49" charset="0"/>
-                <a:ea typeface="Fira Code" panose="020B0509050000020004" pitchFamily="49" charset="0"/>
-              </a:rPr>
-              <a:t>    - redis</a:t>
-            </a:r>
-          </a:p>
-          <a:p>
-            <a:r>
-              <a:rPr lang="fr-FR" dirty="0">
-                <a:solidFill>
-                  <a:srgbClr val="0C5176"/>
-                </a:solidFill>
-                <a:latin typeface="Fira Code" panose="020B0509050000020004" pitchFamily="49" charset="0"/>
-                <a:ea typeface="Fira Code" panose="020B0509050000020004" pitchFamily="49" charset="0"/>
-              </a:rPr>
-              <a:t>  redis:</a:t>
-            </a:r>
-          </a:p>
-          <a:p>
-            <a:r>
-              <a:rPr lang="fr-FR" dirty="0">
-                <a:solidFill>
-                  <a:srgbClr val="0C5176"/>
-                </a:solidFill>
-                <a:latin typeface="Fira Code" panose="020B0509050000020004" pitchFamily="49" charset="0"/>
-                <a:ea typeface="Fira Code" panose="020B0509050000020004" pitchFamily="49" charset="0"/>
-              </a:rPr>
-              <a:t>    image: redis</a:t>
-            </a:r>
-          </a:p>
-          <a:p>
-            <a:r>
-              <a:rPr lang="fr-FR" dirty="0">
-                <a:solidFill>
-                  <a:srgbClr val="0C5176"/>
-                </a:solidFill>
-                <a:latin typeface="Fira Code" panose="020B0509050000020004" pitchFamily="49" charset="0"/>
-                <a:ea typeface="Fira Code" panose="020B0509050000020004" pitchFamily="49" charset="0"/>
-              </a:rPr>
-              <a:t>volumes:</a:t>
-            </a:r>
-          </a:p>
-          <a:p>
-            <a:r>
-              <a:rPr lang="fr-FR" dirty="0">
-                <a:solidFill>
-                  <a:srgbClr val="0C5176"/>
-                </a:solidFill>
-                <a:latin typeface="Fira Code" panose="020B0509050000020004" pitchFamily="49" charset="0"/>
-                <a:ea typeface="Fira Code" panose="020B0509050000020004" pitchFamily="49" charset="0"/>
-              </a:rPr>
-              <a:t>  logvolume01: {}</a:t>
-            </a:r>
-            <a:endParaRPr lang="de-AT" dirty="0">
-              <a:latin typeface="Fira Code" panose="020B0509050000020004" pitchFamily="49" charset="0"/>
-              <a:ea typeface="Fira Code" panose="020B0509050000020004" pitchFamily="49" charset="0"/>
-            </a:endParaRPr>
-          </a:p>
-        </p:txBody>
-      </p:sp>
-    </p:spTree>
-    <p:extLst>
-      <p:ext uri="{BB962C8B-B14F-4D97-AF65-F5344CB8AC3E}">
-        <p14:creationId xmlns:p14="http://schemas.microsoft.com/office/powerpoint/2010/main" val="2718731161"/>
-      </p:ext>
-    </p:extLst>
-  </p:cSld>
-  <p:clrMapOvr>
-    <a:masterClrMapping/>
-  </p:clrMapOvr>
 </p:sld>
 </file>
 

</xml_diff>